<commit_message>
Added /guide as jsp
</commit_message>
<xml_diff>
--- a/cyprus-water.pptx
+++ b/cyprus-water.pptx
@@ -3499,6 +3499,36 @@
           </a:p>
         </p:txBody>
       </p:sp>
+      <p:pic>
+        <p:nvPicPr>
+          <p:cNvPr id="6" name="Picture 5">
+            <a:extLst>
+              <a:ext uri="{FF2B5EF4-FFF2-40B4-BE49-F238E27FC236}">
+                <a16:creationId xmlns:a16="http://schemas.microsoft.com/office/drawing/2014/main" id="{18494323-331D-4096-ABD6-BBC54E89CF0F}"/>
+              </a:ext>
+            </a:extLst>
+          </p:cNvPr>
+          <p:cNvPicPr>
+            <a:picLocks noChangeAspect="1"/>
+          </p:cNvPicPr>
+          <p:nvPr/>
+        </p:nvPicPr>
+        <p:blipFill>
+          <a:blip r:embed="rId4"/>
+          <a:stretch>
+            <a:fillRect/>
+          </a:stretch>
+        </p:blipFill>
+        <p:spPr>
+          <a:xfrm>
+            <a:off x="5117130" y="1121751"/>
+            <a:ext cx="1517728" cy="1524078"/>
+          </a:xfrm>
+          <a:prstGeom prst="rect">
+            <a:avLst/>
+          </a:prstGeom>
+        </p:spPr>
+      </p:pic>
     </p:spTree>
     <p:extLst>
       <p:ext uri="{BB962C8B-B14F-4D97-AF65-F5344CB8AC3E}">
@@ -3626,11 +3656,19 @@
             </a:r>
             <a:r>
               <a:rPr lang="en-CY" dirty="0"/>
-              <a:t>: develop a </a:t>
+              <a:t>: develop a mobile-first </a:t>
             </a:r>
             <a:r>
               <a:rPr lang="en-CY" u="sng" dirty="0"/>
-              <a:t>mobile-first Web app</a:t>
+              <a:t>Web app</a:t>
+            </a:r>
+            <a:r>
+              <a:rPr lang="en-CY" dirty="0"/>
+              <a:t> and </a:t>
+            </a:r>
+            <a:r>
+              <a:rPr lang="en-CY" u="sng" dirty="0"/>
+              <a:t>Backend</a:t>
             </a:r>
             <a:r>
               <a:rPr lang="en-CY" dirty="0"/>
@@ -3677,6 +3715,36 @@
           </a:p>
         </p:txBody>
       </p:sp>
+      <p:pic>
+        <p:nvPicPr>
+          <p:cNvPr id="7" name="Picture 6">
+            <a:extLst>
+              <a:ext uri="{FF2B5EF4-FFF2-40B4-BE49-F238E27FC236}">
+                <a16:creationId xmlns:a16="http://schemas.microsoft.com/office/drawing/2014/main" id="{54C9869F-4228-4092-9E3E-A80D029DEC4D}"/>
+              </a:ext>
+            </a:extLst>
+          </p:cNvPr>
+          <p:cNvPicPr>
+            <a:picLocks noChangeAspect="1"/>
+          </p:cNvPicPr>
+          <p:nvPr/>
+        </p:nvPicPr>
+        <p:blipFill>
+          <a:blip r:embed="rId3"/>
+          <a:stretch>
+            <a:fillRect/>
+          </a:stretch>
+        </p:blipFill>
+        <p:spPr>
+          <a:xfrm>
+            <a:off x="336386" y="5607646"/>
+            <a:ext cx="1003628" cy="1007827"/>
+          </a:xfrm>
+          <a:prstGeom prst="rect">
+            <a:avLst/>
+          </a:prstGeom>
+        </p:spPr>
+      </p:pic>
     </p:spTree>
     <p:extLst>
       <p:ext uri="{BB962C8B-B14F-4D97-AF65-F5344CB8AC3E}">
@@ -4314,6 +4382,36 @@
           </a:p>
         </p:txBody>
       </p:sp>
+      <p:pic>
+        <p:nvPicPr>
+          <p:cNvPr id="13" name="Picture 12">
+            <a:extLst>
+              <a:ext uri="{FF2B5EF4-FFF2-40B4-BE49-F238E27FC236}">
+                <a16:creationId xmlns:a16="http://schemas.microsoft.com/office/drawing/2014/main" id="{D3E89CB5-AAF0-4B88-A74D-34F988E4EECA}"/>
+              </a:ext>
+            </a:extLst>
+          </p:cNvPr>
+          <p:cNvPicPr>
+            <a:picLocks noChangeAspect="1"/>
+          </p:cNvPicPr>
+          <p:nvPr/>
+        </p:nvPicPr>
+        <p:blipFill>
+          <a:blip r:embed="rId7"/>
+          <a:stretch>
+            <a:fillRect/>
+          </a:stretch>
+        </p:blipFill>
+        <p:spPr>
+          <a:xfrm>
+            <a:off x="336386" y="5607646"/>
+            <a:ext cx="1003628" cy="1007827"/>
+          </a:xfrm>
+          <a:prstGeom prst="rect">
+            <a:avLst/>
+          </a:prstGeom>
+        </p:spPr>
+      </p:pic>
     </p:spTree>
     <p:extLst>
       <p:ext uri="{BB962C8B-B14F-4D97-AF65-F5344CB8AC3E}">
@@ -4614,6 +4712,36 @@
           </a:p>
         </p:txBody>
       </p:sp>
+      <p:pic>
+        <p:nvPicPr>
+          <p:cNvPr id="12" name="Picture 11">
+            <a:extLst>
+              <a:ext uri="{FF2B5EF4-FFF2-40B4-BE49-F238E27FC236}">
+                <a16:creationId xmlns:a16="http://schemas.microsoft.com/office/drawing/2014/main" id="{67223C8C-3C2B-4C4C-A5BA-4D3AB28B508A}"/>
+              </a:ext>
+            </a:extLst>
+          </p:cNvPr>
+          <p:cNvPicPr>
+            <a:picLocks noChangeAspect="1"/>
+          </p:cNvPicPr>
+          <p:nvPr/>
+        </p:nvPicPr>
+        <p:blipFill>
+          <a:blip r:embed="rId6"/>
+          <a:stretch>
+            <a:fillRect/>
+          </a:stretch>
+        </p:blipFill>
+        <p:spPr>
+          <a:xfrm>
+            <a:off x="336386" y="5607646"/>
+            <a:ext cx="1003628" cy="1007827"/>
+          </a:xfrm>
+          <a:prstGeom prst="rect">
+            <a:avLst/>
+          </a:prstGeom>
+        </p:spPr>
+      </p:pic>
     </p:spTree>
     <p:extLst>
       <p:ext uri="{BB962C8B-B14F-4D97-AF65-F5344CB8AC3E}">
@@ -4747,7 +4875,7 @@
             </a:r>
             <a:r>
               <a:rPr lang="en-CY" sz="2000" dirty="0"/>
-              <a:t> </a:t>
+              <a:t> (79 commits last 48hrs)</a:t>
             </a:r>
           </a:p>
           <a:p>
@@ -4898,7 +5026,7 @@
         </p:blipFill>
         <p:spPr>
           <a:xfrm>
-            <a:off x="6719628" y="3509493"/>
+            <a:off x="6560120" y="3576461"/>
             <a:ext cx="389317" cy="389317"/>
           </a:xfrm>
           <a:prstGeom prst="rect">
@@ -5150,7 +5278,7 @@
         </p:blipFill>
         <p:spPr>
           <a:xfrm>
-            <a:off x="7785283" y="4503253"/>
+            <a:off x="7543311" y="4433449"/>
             <a:ext cx="392181" cy="392181"/>
           </a:xfrm>
           <a:prstGeom prst="rect">
@@ -6304,6 +6432,36 @@
           <a:xfrm>
             <a:off x="11843105" y="5655481"/>
             <a:ext cx="389317" cy="389317"/>
+          </a:xfrm>
+          <a:prstGeom prst="rect">
+            <a:avLst/>
+          </a:prstGeom>
+        </p:spPr>
+      </p:pic>
+      <p:pic>
+        <p:nvPicPr>
+          <p:cNvPr id="49" name="Picture 48">
+            <a:extLst>
+              <a:ext uri="{FF2B5EF4-FFF2-40B4-BE49-F238E27FC236}">
+                <a16:creationId xmlns:a16="http://schemas.microsoft.com/office/drawing/2014/main" id="{2BF58CD7-BD56-48E1-8D6B-E2FE81177759}"/>
+              </a:ext>
+            </a:extLst>
+          </p:cNvPr>
+          <p:cNvPicPr>
+            <a:picLocks noChangeAspect="1"/>
+          </p:cNvPicPr>
+          <p:nvPr/>
+        </p:nvPicPr>
+        <p:blipFill>
+          <a:blip r:embed="rId8"/>
+          <a:stretch>
+            <a:fillRect/>
+          </a:stretch>
+        </p:blipFill>
+        <p:spPr>
+          <a:xfrm>
+            <a:off x="336386" y="5607646"/>
+            <a:ext cx="1003628" cy="1007827"/>
           </a:xfrm>
           <a:prstGeom prst="rect">
             <a:avLst/>
@@ -8521,6 +8679,36 @@
           </a:p>
         </p:txBody>
       </p:sp>
+      <p:pic>
+        <p:nvPicPr>
+          <p:cNvPr id="5" name="Picture 4">
+            <a:extLst>
+              <a:ext uri="{FF2B5EF4-FFF2-40B4-BE49-F238E27FC236}">
+                <a16:creationId xmlns:a16="http://schemas.microsoft.com/office/drawing/2014/main" id="{FFDB1DFC-9CA9-4497-ACCB-5876F61300EC}"/>
+              </a:ext>
+            </a:extLst>
+          </p:cNvPr>
+          <p:cNvPicPr>
+            <a:picLocks noChangeAspect="1"/>
+          </p:cNvPicPr>
+          <p:nvPr/>
+        </p:nvPicPr>
+        <p:blipFill>
+          <a:blip r:embed="rId3"/>
+          <a:stretch>
+            <a:fillRect/>
+          </a:stretch>
+        </p:blipFill>
+        <p:spPr>
+          <a:xfrm>
+            <a:off x="336386" y="5607646"/>
+            <a:ext cx="1003628" cy="1007827"/>
+          </a:xfrm>
+          <a:prstGeom prst="rect">
+            <a:avLst/>
+          </a:prstGeom>
+        </p:spPr>
+      </p:pic>
     </p:spTree>
     <p:extLst>
       <p:ext uri="{BB962C8B-B14F-4D97-AF65-F5344CB8AC3E}">

</xml_diff>